<commit_message>
Added Course Materials for CSS3
</commit_message>
<xml_diff>
--- a/9. HTML 5, CSS3 with Bootstrap 4, JavaScript ES6/1. HTML5/2. Creating Forms in HTML/Slides/2. Understanding HTML Forms/understanding-html-forms-slides.pptx
+++ b/9. HTML 5, CSS3 with Bootstrap 4, JavaScript ES6/1. HTML5/2. Creating Forms in HTML/Slides/2. Understanding HTML Forms/understanding-html-forms-slides.pptx
@@ -2452,14 +2452,15 @@
         </p:nvPicPr>
         <p:blipFill>
           <a:blip r:embed="rId1"/>
+          <a:srcRect b="10063"/>
           <a:stretch>
             <a:fillRect/>
           </a:stretch>
         </p:blipFill>
         <p:spPr>
           <a:xfrm>
-            <a:off x="910590" y="3886200"/>
-            <a:ext cx="10371455" cy="1621790"/>
+            <a:off x="909955" y="3886200"/>
+            <a:ext cx="10371455" cy="1458595"/>
           </a:xfrm>
           <a:prstGeom prst="rect">
             <a:avLst/>

</xml_diff>